<commit_message>
fixed minimax in tictactoe
</commit_message>
<xml_diff>
--- a/files/Sr preso (1).pptx
+++ b/files/Sr preso (1).pptx
@@ -7,12 +7,15 @@
   <p:sldIdLst>
     <p:sldId id="256" r:id="rId2"/>
     <p:sldId id="257" r:id="rId3"/>
-    <p:sldId id="258" r:id="rId4"/>
-    <p:sldId id="259" r:id="rId5"/>
-    <p:sldId id="260" r:id="rId6"/>
-    <p:sldId id="261" r:id="rId7"/>
-    <p:sldId id="262" r:id="rId8"/>
-    <p:sldId id="263" r:id="rId9"/>
+    <p:sldId id="266" r:id="rId4"/>
+    <p:sldId id="258" r:id="rId5"/>
+    <p:sldId id="264" r:id="rId6"/>
+    <p:sldId id="265" r:id="rId7"/>
+    <p:sldId id="259" r:id="rId8"/>
+    <p:sldId id="260" r:id="rId9"/>
+    <p:sldId id="261" r:id="rId10"/>
+    <p:sldId id="262" r:id="rId11"/>
+    <p:sldId id="263" r:id="rId12"/>
   </p:sldIdLst>
   <p:sldSz cx="9144000" cy="6858000" type="screen4x3"/>
   <p:notesSz cx="6858000" cy="9144000"/>
@@ -344,7 +347,7 @@
             <a:fld id="{8E36636D-D922-432D-A958-524484B5923D}" type="datetimeFigureOut">
               <a:rPr lang="en-US" smtClean="0"/>
               <a:pPr/>
-              <a:t>4/21/2020</a:t>
+              <a:t>4/23/2020</a:t>
             </a:fld>
             <a:endParaRPr lang="en-US"/>
           </a:p>
@@ -691,7 +694,7 @@
             <a:fld id="{8E36636D-D922-432D-A958-524484B5923D}" type="datetimeFigureOut">
               <a:rPr lang="en-US" smtClean="0"/>
               <a:pPr/>
-              <a:t>4/21/2020</a:t>
+              <a:t>4/23/2020</a:t>
             </a:fld>
             <a:endParaRPr lang="en-US"/>
           </a:p>
@@ -811,7 +814,7 @@
             <a:fld id="{8E36636D-D922-432D-A958-524484B5923D}" type="datetimeFigureOut">
               <a:rPr lang="en-US" smtClean="0"/>
               <a:pPr/>
-              <a:t>4/21/2020</a:t>
+              <a:t>4/23/2020</a:t>
             </a:fld>
             <a:endParaRPr lang="en-US"/>
           </a:p>
@@ -1182,7 +1185,7 @@
             <a:fld id="{8E36636D-D922-432D-A958-524484B5923D}" type="datetimeFigureOut">
               <a:rPr lang="en-US" smtClean="0"/>
               <a:pPr/>
-              <a:t>4/21/2020</a:t>
+              <a:t>4/23/2020</a:t>
             </a:fld>
             <a:endParaRPr lang="en-US"/>
           </a:p>
@@ -1391,7 +1394,7 @@
             <a:fld id="{8E36636D-D922-432D-A958-524484B5923D}" type="datetimeFigureOut">
               <a:rPr lang="en-US" smtClean="0"/>
               <a:pPr/>
-              <a:t>4/21/2020</a:t>
+              <a:t>4/23/2020</a:t>
             </a:fld>
             <a:endParaRPr lang="en-US"/>
           </a:p>
@@ -1561,7 +1564,7 @@
             <a:fld id="{8E36636D-D922-432D-A958-524484B5923D}" type="datetimeFigureOut">
               <a:rPr lang="en-US" smtClean="0"/>
               <a:pPr/>
-              <a:t>4/21/2020</a:t>
+              <a:t>4/23/2020</a:t>
             </a:fld>
             <a:endParaRPr lang="en-US"/>
           </a:p>
@@ -1881,7 +1884,7 @@
             <a:fld id="{8E36636D-D922-432D-A958-524484B5923D}" type="datetimeFigureOut">
               <a:rPr lang="en-US" smtClean="0"/>
               <a:pPr/>
-              <a:t>4/21/2020</a:t>
+              <a:t>4/23/2020</a:t>
             </a:fld>
             <a:endParaRPr lang="en-US"/>
           </a:p>
@@ -2192,7 +2195,7 @@
             <a:fld id="{8E36636D-D922-432D-A958-524484B5923D}" type="datetimeFigureOut">
               <a:rPr lang="en-US" smtClean="0"/>
               <a:pPr/>
-              <a:t>4/21/2020</a:t>
+              <a:t>4/23/2020</a:t>
             </a:fld>
             <a:endParaRPr lang="en-US"/>
           </a:p>
@@ -2480,7 +2483,7 @@
             <a:fld id="{8E36636D-D922-432D-A958-524484B5923D}" type="datetimeFigureOut">
               <a:rPr lang="en-US" smtClean="0"/>
               <a:pPr/>
-              <a:t>4/21/2020</a:t>
+              <a:t>4/23/2020</a:t>
             </a:fld>
             <a:endParaRPr lang="en-US"/>
           </a:p>
@@ -3060,7 +3063,7 @@
             <a:fld id="{8E36636D-D922-432D-A958-524484B5923D}" type="datetimeFigureOut">
               <a:rPr lang="en-US" smtClean="0"/>
               <a:pPr/>
-              <a:t>4/21/2020</a:t>
+              <a:t>4/23/2020</a:t>
             </a:fld>
             <a:endParaRPr lang="en-US"/>
           </a:p>
@@ -3175,7 +3178,7 @@
             <a:fld id="{8E36636D-D922-432D-A958-524484B5923D}" type="datetimeFigureOut">
               <a:rPr lang="en-US" smtClean="0"/>
               <a:pPr/>
-              <a:t>4/21/2020</a:t>
+              <a:t>4/23/2020</a:t>
             </a:fld>
             <a:endParaRPr lang="en-US"/>
           </a:p>
@@ -3291,7 +3294,7 @@
             <a:fld id="{8E36636D-D922-432D-A958-524484B5923D}" type="datetimeFigureOut">
               <a:rPr lang="en-US" smtClean="0"/>
               <a:pPr/>
-              <a:t>4/21/2020</a:t>
+              <a:t>4/23/2020</a:t>
             </a:fld>
             <a:endParaRPr lang="en-US"/>
           </a:p>
@@ -3646,7 +3649,7 @@
             <a:fld id="{8E36636D-D922-432D-A958-524484B5923D}" type="datetimeFigureOut">
               <a:rPr lang="en-US" smtClean="0"/>
               <a:pPr/>
-              <a:t>4/21/2020</a:t>
+              <a:t>4/23/2020</a:t>
             </a:fld>
             <a:endParaRPr lang="en-US"/>
           </a:p>
@@ -3878,7 +3881,7 @@
             <a:fld id="{8E36636D-D922-432D-A958-524484B5923D}" type="datetimeFigureOut">
               <a:rPr lang="en-US" smtClean="0"/>
               <a:pPr/>
-              <a:t>4/21/2020</a:t>
+              <a:t>4/23/2020</a:t>
             </a:fld>
             <a:endParaRPr lang="en-US"/>
           </a:p>
@@ -4415,6 +4418,148 @@
 </p:sld>
 </file>
 
+<file path=ppt/slides/slide10.xml><?xml version="1.0" encoding="utf-8"?>
+<p:sld xmlns:a="http://schemas.openxmlformats.org/drawingml/2006/main" xmlns:r="http://schemas.openxmlformats.org/officeDocument/2006/relationships" xmlns:p="http://schemas.openxmlformats.org/presentationml/2006/main">
+  <p:cSld>
+    <p:spTree>
+      <p:nvGrpSpPr>
+        <p:cNvPr id="1" name=""/>
+        <p:cNvGrpSpPr/>
+        <p:nvPr/>
+      </p:nvGrpSpPr>
+      <p:grpSpPr>
+        <a:xfrm>
+          <a:off x="0" y="0"/>
+          <a:ext cx="0" cy="0"/>
+          <a:chOff x="0" y="0"/>
+          <a:chExt cx="0" cy="0"/>
+        </a:xfrm>
+      </p:grpSpPr>
+      <p:sp>
+        <p:nvSpPr>
+          <p:cNvPr id="2" name="Title 1"/>
+          <p:cNvSpPr>
+            <a:spLocks noGrp="1"/>
+          </p:cNvSpPr>
+          <p:nvPr>
+            <p:ph type="title"/>
+          </p:nvPr>
+        </p:nvSpPr>
+        <p:spPr/>
+        <p:txBody>
+          <a:bodyPr/>
+          <a:lstStyle/>
+          <a:p>
+            <a:r>
+              <a:rPr lang="en-US" dirty="0"/>
+              <a:t>Citations</a:t>
+            </a:r>
+          </a:p>
+        </p:txBody>
+      </p:sp>
+      <p:sp>
+        <p:nvSpPr>
+          <p:cNvPr id="3" name="Content Placeholder 2"/>
+          <p:cNvSpPr>
+            <a:spLocks noGrp="1"/>
+          </p:cNvSpPr>
+          <p:nvPr>
+            <p:ph idx="1"/>
+          </p:nvPr>
+        </p:nvSpPr>
+        <p:spPr/>
+        <p:txBody>
+          <a:bodyPr/>
+          <a:lstStyle/>
+          <a:p>
+            <a:endParaRPr lang="en-US"/>
+          </a:p>
+        </p:txBody>
+      </p:sp>
+    </p:spTree>
+    <p:extLst>
+      <p:ext uri="{BB962C8B-B14F-4D97-AF65-F5344CB8AC3E}">
+        <p14:creationId xmlns:p14="http://schemas.microsoft.com/office/powerpoint/2010/main" val="3349725579"/>
+      </p:ext>
+    </p:extLst>
+  </p:cSld>
+  <p:clrMapOvr>
+    <a:masterClrMapping/>
+  </p:clrMapOvr>
+</p:sld>
+</file>
+
+<file path=ppt/slides/slide11.xml><?xml version="1.0" encoding="utf-8"?>
+<p:sld xmlns:a="http://schemas.openxmlformats.org/drawingml/2006/main" xmlns:r="http://schemas.openxmlformats.org/officeDocument/2006/relationships" xmlns:p="http://schemas.openxmlformats.org/presentationml/2006/main">
+  <p:cSld>
+    <p:spTree>
+      <p:nvGrpSpPr>
+        <p:cNvPr id="1" name=""/>
+        <p:cNvGrpSpPr/>
+        <p:nvPr/>
+      </p:nvGrpSpPr>
+      <p:grpSpPr>
+        <a:xfrm>
+          <a:off x="0" y="0"/>
+          <a:ext cx="0" cy="0"/>
+          <a:chOff x="0" y="0"/>
+          <a:chExt cx="0" cy="0"/>
+        </a:xfrm>
+      </p:grpSpPr>
+      <p:sp>
+        <p:nvSpPr>
+          <p:cNvPr id="2" name="Title 1"/>
+          <p:cNvSpPr>
+            <a:spLocks noGrp="1"/>
+          </p:cNvSpPr>
+          <p:nvPr>
+            <p:ph type="title"/>
+          </p:nvPr>
+        </p:nvSpPr>
+        <p:spPr/>
+        <p:txBody>
+          <a:bodyPr/>
+          <a:lstStyle/>
+          <a:p>
+            <a:r>
+              <a:rPr lang="en-US"/>
+              <a:t>Questions</a:t>
+            </a:r>
+          </a:p>
+        </p:txBody>
+      </p:sp>
+      <p:sp>
+        <p:nvSpPr>
+          <p:cNvPr id="3" name="Content Placeholder 2"/>
+          <p:cNvSpPr>
+            <a:spLocks noGrp="1"/>
+          </p:cNvSpPr>
+          <p:nvPr>
+            <p:ph idx="1"/>
+          </p:nvPr>
+        </p:nvSpPr>
+        <p:spPr/>
+        <p:txBody>
+          <a:bodyPr/>
+          <a:lstStyle/>
+          <a:p>
+            <a:endParaRPr lang="en-US"/>
+          </a:p>
+        </p:txBody>
+      </p:sp>
+    </p:spTree>
+    <p:extLst>
+      <p:ext uri="{BB962C8B-B14F-4D97-AF65-F5344CB8AC3E}">
+        <p14:creationId xmlns:p14="http://schemas.microsoft.com/office/powerpoint/2010/main" val="2662455582"/>
+      </p:ext>
+    </p:extLst>
+  </p:cSld>
+  <p:clrMapOvr>
+    <a:masterClrMapping/>
+  </p:clrMapOvr>
+</p:sld>
+</file>
+
 <file path=ppt/slides/slide2.xml><?xml version="1.0" encoding="utf-8"?>
 <p:sld xmlns:a="http://schemas.openxmlformats.org/drawingml/2006/main" xmlns:r="http://schemas.openxmlformats.org/officeDocument/2006/relationships" xmlns:p="http://schemas.openxmlformats.org/presentationml/2006/main">
   <p:cSld>
@@ -4493,7 +4638,10 @@
             </a:r>
           </a:p>
           <a:p>
-            <a:endParaRPr lang="en-US" dirty="0"/>
+            <a:r>
+              <a:rPr lang="en-US" dirty="0"/>
+              <a:t>The fundamentals of AI Implemented through</a:t>
+            </a:r>
           </a:p>
           <a:p>
             <a:endParaRPr lang="en-US" dirty="0"/>
@@ -4532,7 +4680,13 @@
       </p:grpSpPr>
       <p:sp>
         <p:nvSpPr>
-          <p:cNvPr id="2" name="Title 1"/>
+          <p:cNvPr id="2" name="Title 1">
+            <a:extLst>
+              <a:ext uri="{FF2B5EF4-FFF2-40B4-BE49-F238E27FC236}">
+                <a16:creationId xmlns:a16="http://schemas.microsoft.com/office/drawing/2014/main" id="{B499FD59-462E-4AF9-8E5D-7A464DE1AA51}"/>
+              </a:ext>
+            </a:extLst>
+          </p:cNvPr>
           <p:cNvSpPr>
             <a:spLocks noGrp="1"/>
           </p:cNvSpPr>
@@ -4547,14 +4701,20 @@
           <a:p>
             <a:r>
               <a:rPr lang="en-US" dirty="0"/>
-              <a:t>Analysis &amp; Design </a:t>
-            </a:r>
-          </a:p>
-        </p:txBody>
-      </p:sp>
-      <p:sp>
-        <p:nvSpPr>
-          <p:cNvPr id="3" name="Content Placeholder 2"/>
+              <a:t>Overview</a:t>
+            </a:r>
+          </a:p>
+        </p:txBody>
+      </p:sp>
+      <p:sp>
+        <p:nvSpPr>
+          <p:cNvPr id="3" name="Content Placeholder 2">
+            <a:extLst>
+              <a:ext uri="{FF2B5EF4-FFF2-40B4-BE49-F238E27FC236}">
+                <a16:creationId xmlns:a16="http://schemas.microsoft.com/office/drawing/2014/main" id="{72B31052-4067-4FB0-989A-23DA67D5D810}"/>
+              </a:ext>
+            </a:extLst>
+          </p:cNvPr>
           <p:cNvSpPr>
             <a:spLocks noGrp="1"/>
           </p:cNvSpPr>
@@ -4569,19 +4729,28 @@
           <a:p>
             <a:r>
               <a:rPr lang="en-US" dirty="0"/>
-              <a:t>Algorithms</a:t>
-            </a:r>
-          </a:p>
-          <a:p>
+              <a:t>Why</a:t>
+            </a:r>
+          </a:p>
+          <a:p>
+            <a:pPr lvl="1"/>
             <a:r>
               <a:rPr lang="en-US" dirty="0"/>
-              <a:t>Minimax</a:t>
-            </a:r>
-          </a:p>
-          <a:p>
+              <a:t>I’ve programmed tic-tac-toe and connect4 before in C++  but now I want to build upon it. </a:t>
+            </a:r>
+          </a:p>
+          <a:p>
+            <a:pPr lvl="1"/>
             <a:r>
               <a:rPr lang="en-US" dirty="0"/>
-              <a:t>Pruning</a:t>
+              <a:t>I wanted to add an AI to play against. </a:t>
+            </a:r>
+          </a:p>
+          <a:p>
+            <a:pPr lvl="1"/>
+            <a:r>
+              <a:rPr lang="en-US" dirty="0"/>
+              <a:t>I wanted to build a website. </a:t>
             </a:r>
           </a:p>
         </p:txBody>
@@ -4589,7 +4758,7 @@
     </p:spTree>
     <p:extLst>
       <p:ext uri="{BB962C8B-B14F-4D97-AF65-F5344CB8AC3E}">
-        <p14:creationId xmlns:p14="http://schemas.microsoft.com/office/powerpoint/2010/main" val="4060843022"/>
+        <p14:creationId xmlns:p14="http://schemas.microsoft.com/office/powerpoint/2010/main" val="2702684541"/>
       </p:ext>
     </p:extLst>
   </p:cSld>
@@ -4633,7 +4802,7 @@
           <a:p>
             <a:r>
               <a:rPr lang="en-US" dirty="0"/>
-              <a:t>Implementation</a:t>
+              <a:t>Analysis &amp; Design </a:t>
             </a:r>
           </a:p>
         </p:txBody>
@@ -4655,18 +4824,27 @@
           <a:p>
             <a:r>
               <a:rPr lang="en-US" dirty="0"/>
-              <a:t>Code</a:t>
-            </a:r>
-          </a:p>
-          <a:p>
-            <a:endParaRPr lang="en-US" dirty="0"/>
+              <a:t>Algorithms</a:t>
+            </a:r>
+          </a:p>
+          <a:p>
+            <a:r>
+              <a:rPr lang="en-US" dirty="0"/>
+              <a:t>Minimax</a:t>
+            </a:r>
+          </a:p>
+          <a:p>
+            <a:r>
+              <a:rPr lang="en-US" dirty="0"/>
+              <a:t>Pruning</a:t>
+            </a:r>
           </a:p>
         </p:txBody>
       </p:sp>
     </p:spTree>
     <p:extLst>
       <p:ext uri="{BB962C8B-B14F-4D97-AF65-F5344CB8AC3E}">
-        <p14:creationId xmlns:p14="http://schemas.microsoft.com/office/powerpoint/2010/main" val="3258867372"/>
+        <p14:creationId xmlns:p14="http://schemas.microsoft.com/office/powerpoint/2010/main" val="4060843022"/>
       </p:ext>
     </p:extLst>
   </p:cSld>
@@ -4695,7 +4873,13 @@
       </p:grpSpPr>
       <p:sp>
         <p:nvSpPr>
-          <p:cNvPr id="2" name="Title 1"/>
+          <p:cNvPr id="2" name="Title 1">
+            <a:extLst>
+              <a:ext uri="{FF2B5EF4-FFF2-40B4-BE49-F238E27FC236}">
+                <a16:creationId xmlns:a16="http://schemas.microsoft.com/office/drawing/2014/main" id="{EC740416-A1A4-4C45-B27B-903756E2366F}"/>
+              </a:ext>
+            </a:extLst>
+          </p:cNvPr>
           <p:cNvSpPr>
             <a:spLocks noGrp="1"/>
           </p:cNvSpPr>
@@ -4710,40 +4894,77 @@
           <a:p>
             <a:r>
               <a:rPr lang="en-US" dirty="0"/>
-              <a:t>Testing</a:t>
-            </a:r>
-          </a:p>
-        </p:txBody>
-      </p:sp>
-      <p:sp>
-        <p:nvSpPr>
-          <p:cNvPr id="3" name="Content Placeholder 2"/>
-          <p:cNvSpPr>
-            <a:spLocks noGrp="1"/>
-          </p:cNvSpPr>
+              <a:t>Minimax Algorithm</a:t>
+            </a:r>
+          </a:p>
+        </p:txBody>
+      </p:sp>
+      <p:pic>
+        <p:nvPicPr>
+          <p:cNvPr id="4" name="Picture 4" descr="Image result for minimax algorithm">
+            <a:extLst>
+              <a:ext uri="{FF2B5EF4-FFF2-40B4-BE49-F238E27FC236}">
+                <a16:creationId xmlns:a16="http://schemas.microsoft.com/office/drawing/2014/main" id="{F2FE21F3-294E-4A93-97F6-621BB8F4D319}"/>
+              </a:ext>
+            </a:extLst>
+          </p:cNvPr>
+          <p:cNvPicPr>
+            <a:picLocks noGrp="1" noChangeAspect="1" noChangeArrowheads="1"/>
+          </p:cNvPicPr>
           <p:nvPr>
             <p:ph idx="1"/>
           </p:nvPr>
-        </p:nvSpPr>
-        <p:spPr/>
-        <p:txBody>
-          <a:bodyPr/>
-          <a:lstStyle/>
-          <a:p>
-            <a:r>
-              <a:rPr lang="en-US" dirty="0"/>
-              <a:t>Playing the game!</a:t>
-            </a:r>
-          </a:p>
-          <a:p>
-            <a:endParaRPr lang="en-US" dirty="0"/>
-          </a:p>
-        </p:txBody>
-      </p:sp>
+        </p:nvPicPr>
+        <p:blipFill>
+          <a:blip r:embed="rId2">
+            <a:extLst>
+              <a:ext uri="{28A0092B-C50C-407E-A947-70E740481C1C}">
+                <a14:useLocalDpi xmlns:a14="http://schemas.microsoft.com/office/drawing/2010/main" val="0"/>
+              </a:ext>
+            </a:extLst>
+          </a:blip>
+          <a:srcRect/>
+          <a:stretch>
+            <a:fillRect/>
+          </a:stretch>
+        </p:blipFill>
+        <p:spPr bwMode="auto">
+          <a:xfrm>
+            <a:off x="265837" y="1717432"/>
+            <a:ext cx="8580565" cy="3890887"/>
+          </a:xfrm>
+          <a:prstGeom prst="rect">
+            <a:avLst/>
+          </a:prstGeom>
+          <a:ln w="38100" cap="sq">
+            <a:solidFill>
+              <a:srgbClr val="000000"/>
+            </a:solidFill>
+            <a:prstDash val="solid"/>
+            <a:miter lim="800000"/>
+          </a:ln>
+          <a:effectLst>
+            <a:outerShdw blurRad="50800" dist="38100" dir="2700000" algn="tl" rotWithShape="0">
+              <a:srgbClr val="000000">
+                <a:alpha val="43000"/>
+              </a:srgbClr>
+            </a:outerShdw>
+          </a:effectLst>
+          <a:extLst>
+            <a:ext uri="{909E8E84-426E-40DD-AFC4-6F175D3DCCD1}">
+              <a14:hiddenFill xmlns:a14="http://schemas.microsoft.com/office/drawing/2010/main">
+                <a:solidFill>
+                  <a:srgbClr val="FFFFFF"/>
+                </a:solidFill>
+              </a14:hiddenFill>
+            </a:ext>
+          </a:extLst>
+        </p:spPr>
+      </p:pic>
     </p:spTree>
     <p:extLst>
       <p:ext uri="{BB962C8B-B14F-4D97-AF65-F5344CB8AC3E}">
-        <p14:creationId xmlns:p14="http://schemas.microsoft.com/office/powerpoint/2010/main" val="2478263596"/>
+        <p14:creationId xmlns:p14="http://schemas.microsoft.com/office/powerpoint/2010/main" val="1500479990"/>
       </p:ext>
     </p:extLst>
   </p:cSld>
@@ -4772,7 +4993,13 @@
       </p:grpSpPr>
       <p:sp>
         <p:nvSpPr>
-          <p:cNvPr id="2" name="Title 1"/>
+          <p:cNvPr id="2" name="Title 1">
+            <a:extLst>
+              <a:ext uri="{FF2B5EF4-FFF2-40B4-BE49-F238E27FC236}">
+                <a16:creationId xmlns:a16="http://schemas.microsoft.com/office/drawing/2014/main" id="{D2CE7CA5-F8BA-4EB0-837B-FF25E22B9B90}"/>
+              </a:ext>
+            </a:extLst>
+          </p:cNvPr>
           <p:cNvSpPr>
             <a:spLocks noGrp="1"/>
           </p:cNvSpPr>
@@ -4787,37 +5014,77 @@
           <a:p>
             <a:r>
               <a:rPr lang="en-US" dirty="0"/>
-              <a:t>Demonstration</a:t>
-            </a:r>
-          </a:p>
-        </p:txBody>
-      </p:sp>
-      <p:sp>
-        <p:nvSpPr>
-          <p:cNvPr id="3" name="Content Placeholder 2"/>
-          <p:cNvSpPr>
-            <a:spLocks noGrp="1"/>
-          </p:cNvSpPr>
+              <a:t>Minimax cont.</a:t>
+            </a:r>
+          </a:p>
+        </p:txBody>
+      </p:sp>
+      <p:pic>
+        <p:nvPicPr>
+          <p:cNvPr id="4" name="Picture 2" descr="Image result for minimax algorithm">
+            <a:extLst>
+              <a:ext uri="{FF2B5EF4-FFF2-40B4-BE49-F238E27FC236}">
+                <a16:creationId xmlns:a16="http://schemas.microsoft.com/office/drawing/2014/main" id="{792B6AB1-AD24-4FAD-991D-4E47484F3DAC}"/>
+              </a:ext>
+            </a:extLst>
+          </p:cNvPr>
+          <p:cNvPicPr>
+            <a:picLocks noGrp="1" noChangeAspect="1" noChangeArrowheads="1"/>
+          </p:cNvPicPr>
           <p:nvPr>
             <p:ph idx="1"/>
           </p:nvPr>
-        </p:nvSpPr>
-        <p:spPr/>
-        <p:txBody>
-          <a:bodyPr/>
-          <a:lstStyle/>
-          <a:p>
-            <a:r>
-              <a:rPr lang="en-US" dirty="0"/>
-              <a:t>dextermiller.com</a:t>
-            </a:r>
-          </a:p>
-        </p:txBody>
-      </p:sp>
+        </p:nvPicPr>
+        <p:blipFill>
+          <a:blip r:embed="rId2">
+            <a:extLst>
+              <a:ext uri="{28A0092B-C50C-407E-A947-70E740481C1C}">
+                <a14:useLocalDpi xmlns:a14="http://schemas.microsoft.com/office/drawing/2010/main" val="0"/>
+              </a:ext>
+            </a:extLst>
+          </a:blip>
+          <a:srcRect/>
+          <a:stretch>
+            <a:fillRect/>
+          </a:stretch>
+        </p:blipFill>
+        <p:spPr bwMode="auto">
+          <a:xfrm>
+            <a:off x="1986343" y="1191589"/>
+            <a:ext cx="5171314" cy="5479695"/>
+          </a:xfrm>
+          <a:prstGeom prst="rect">
+            <a:avLst/>
+          </a:prstGeom>
+          <a:ln w="38100" cap="sq">
+            <a:solidFill>
+              <a:srgbClr val="000000"/>
+            </a:solidFill>
+            <a:prstDash val="solid"/>
+            <a:miter lim="800000"/>
+          </a:ln>
+          <a:effectLst>
+            <a:outerShdw blurRad="50800" dist="38100" dir="2700000" algn="tl" rotWithShape="0">
+              <a:srgbClr val="000000">
+                <a:alpha val="43000"/>
+              </a:srgbClr>
+            </a:outerShdw>
+          </a:effectLst>
+          <a:extLst>
+            <a:ext uri="{909E8E84-426E-40DD-AFC4-6F175D3DCCD1}">
+              <a14:hiddenFill xmlns:a14="http://schemas.microsoft.com/office/drawing/2010/main">
+                <a:solidFill>
+                  <a:srgbClr val="FFFFFF"/>
+                </a:solidFill>
+              </a14:hiddenFill>
+            </a:ext>
+          </a:extLst>
+        </p:spPr>
+      </p:pic>
     </p:spTree>
     <p:extLst>
       <p:ext uri="{BB962C8B-B14F-4D97-AF65-F5344CB8AC3E}">
-        <p14:creationId xmlns:p14="http://schemas.microsoft.com/office/powerpoint/2010/main" val="2468445757"/>
+        <p14:creationId xmlns:p14="http://schemas.microsoft.com/office/powerpoint/2010/main" val="688692606"/>
       </p:ext>
     </p:extLst>
   </p:cSld>
@@ -4861,7 +5128,7 @@
           <a:p>
             <a:r>
               <a:rPr lang="en-US" dirty="0"/>
-              <a:t>Citations</a:t>
+              <a:t>Minimax Pseudocode</a:t>
             </a:r>
           </a:p>
         </p:txBody>
@@ -4881,14 +5148,56 @@
           <a:bodyPr/>
           <a:lstStyle/>
           <a:p>
-            <a:endParaRPr lang="en-US"/>
-          </a:p>
-        </p:txBody>
-      </p:sp>
+            <a:pPr marL="0" indent="0">
+              <a:buNone/>
+            </a:pPr>
+            <a:endParaRPr lang="en-US" dirty="0"/>
+          </a:p>
+          <a:p>
+            <a:endParaRPr lang="en-US" dirty="0"/>
+          </a:p>
+        </p:txBody>
+      </p:sp>
+      <p:pic>
+        <p:nvPicPr>
+          <p:cNvPr id="5" name="Picture 4">
+            <a:extLst>
+              <a:ext uri="{FF2B5EF4-FFF2-40B4-BE49-F238E27FC236}">
+                <a16:creationId xmlns:a16="http://schemas.microsoft.com/office/drawing/2014/main" id="{9FE1A9B2-276F-4B40-A0BE-72B956506044}"/>
+              </a:ext>
+            </a:extLst>
+          </p:cNvPr>
+          <p:cNvPicPr>
+            <a:picLocks noChangeAspect="1"/>
+          </p:cNvPicPr>
+          <p:nvPr/>
+        </p:nvPicPr>
+        <p:blipFill>
+          <a:blip r:embed="rId2">
+            <a:extLst>
+              <a:ext uri="{28A0092B-C50C-407E-A947-70E740481C1C}">
+                <a14:useLocalDpi xmlns:a14="http://schemas.microsoft.com/office/drawing/2010/main" val="0"/>
+              </a:ext>
+            </a:extLst>
+          </a:blip>
+          <a:stretch>
+            <a:fillRect/>
+          </a:stretch>
+        </p:blipFill>
+        <p:spPr>
+          <a:xfrm>
+            <a:off x="153709" y="1889760"/>
+            <a:ext cx="8793707" cy="4001453"/>
+          </a:xfrm>
+          <a:prstGeom prst="rect">
+            <a:avLst/>
+          </a:prstGeom>
+        </p:spPr>
+      </p:pic>
     </p:spTree>
     <p:extLst>
       <p:ext uri="{BB962C8B-B14F-4D97-AF65-F5344CB8AC3E}">
-        <p14:creationId xmlns:p14="http://schemas.microsoft.com/office/powerpoint/2010/main" val="3349725579"/>
+        <p14:creationId xmlns:p14="http://schemas.microsoft.com/office/powerpoint/2010/main" val="3258867372"/>
       </p:ext>
     </p:extLst>
   </p:cSld>
@@ -4931,8 +5240,8 @@
           <a:lstStyle/>
           <a:p>
             <a:r>
-              <a:rPr lang="en-US"/>
-              <a:t>Questions</a:t>
+              <a:rPr lang="en-US" dirty="0"/>
+              <a:t>Testing</a:t>
             </a:r>
           </a:p>
         </p:txBody>
@@ -4952,14 +5261,94 @@
           <a:bodyPr/>
           <a:lstStyle/>
           <a:p>
-            <a:endParaRPr lang="en-US"/>
+            <a:r>
+              <a:rPr lang="en-US" dirty="0"/>
+              <a:t>Playing the game!</a:t>
+            </a:r>
+          </a:p>
+          <a:p>
+            <a:endParaRPr lang="en-US" dirty="0"/>
           </a:p>
         </p:txBody>
       </p:sp>
     </p:spTree>
     <p:extLst>
       <p:ext uri="{BB962C8B-B14F-4D97-AF65-F5344CB8AC3E}">
-        <p14:creationId xmlns:p14="http://schemas.microsoft.com/office/powerpoint/2010/main" val="2662455582"/>
+        <p14:creationId xmlns:p14="http://schemas.microsoft.com/office/powerpoint/2010/main" val="2478263596"/>
+      </p:ext>
+    </p:extLst>
+  </p:cSld>
+  <p:clrMapOvr>
+    <a:masterClrMapping/>
+  </p:clrMapOvr>
+</p:sld>
+</file>
+
+<file path=ppt/slides/slide9.xml><?xml version="1.0" encoding="utf-8"?>
+<p:sld xmlns:a="http://schemas.openxmlformats.org/drawingml/2006/main" xmlns:r="http://schemas.openxmlformats.org/officeDocument/2006/relationships" xmlns:p="http://schemas.openxmlformats.org/presentationml/2006/main">
+  <p:cSld>
+    <p:spTree>
+      <p:nvGrpSpPr>
+        <p:cNvPr id="1" name=""/>
+        <p:cNvGrpSpPr/>
+        <p:nvPr/>
+      </p:nvGrpSpPr>
+      <p:grpSpPr>
+        <a:xfrm>
+          <a:off x="0" y="0"/>
+          <a:ext cx="0" cy="0"/>
+          <a:chOff x="0" y="0"/>
+          <a:chExt cx="0" cy="0"/>
+        </a:xfrm>
+      </p:grpSpPr>
+      <p:sp>
+        <p:nvSpPr>
+          <p:cNvPr id="2" name="Title 1"/>
+          <p:cNvSpPr>
+            <a:spLocks noGrp="1"/>
+          </p:cNvSpPr>
+          <p:nvPr>
+            <p:ph type="title"/>
+          </p:nvPr>
+        </p:nvSpPr>
+        <p:spPr/>
+        <p:txBody>
+          <a:bodyPr/>
+          <a:lstStyle/>
+          <a:p>
+            <a:r>
+              <a:rPr lang="en-US" dirty="0"/>
+              <a:t>Demonstration</a:t>
+            </a:r>
+          </a:p>
+        </p:txBody>
+      </p:sp>
+      <p:sp>
+        <p:nvSpPr>
+          <p:cNvPr id="3" name="Content Placeholder 2"/>
+          <p:cNvSpPr>
+            <a:spLocks noGrp="1"/>
+          </p:cNvSpPr>
+          <p:nvPr>
+            <p:ph idx="1"/>
+          </p:nvPr>
+        </p:nvSpPr>
+        <p:spPr/>
+        <p:txBody>
+          <a:bodyPr/>
+          <a:lstStyle/>
+          <a:p>
+            <a:r>
+              <a:rPr lang="en-US" dirty="0"/>
+              <a:t>dextermiller.com</a:t>
+            </a:r>
+          </a:p>
+        </p:txBody>
+      </p:sp>
+    </p:spTree>
+    <p:extLst>
+      <p:ext uri="{BB962C8B-B14F-4D97-AF65-F5344CB8AC3E}">
+        <p14:creationId xmlns:p14="http://schemas.microsoft.com/office/powerpoint/2010/main" val="2468445757"/>
       </p:ext>
     </p:extLst>
   </p:cSld>

</xml_diff>